<commit_message>
working on slides, nearly finished...
</commit_message>
<xml_diff>
--- a/Academic Work/presentations/prague/Evolve - Introduction.pptx
+++ b/Academic Work/presentations/prague/Evolve - Introduction.pptx
@@ -221,7 +221,7 @@
             <a:fld id="{CC899B31-23B7-41FA-A7A8-47EAF8E80A0A}" type="datetimeFigureOut">
               <a:rPr lang="en-US" smtClean="0"/>
               <a:pPr/>
-              <a:t>2/2/2011</a:t>
+              <a:t>2/3/2011</a:t>
             </a:fld>
             <a:endParaRPr lang="en-GB"/>
           </a:p>
@@ -856,8 +856,29 @@
           <a:p>
             <a:r>
               <a:rPr lang="en-GB" dirty="0" smtClean="0"/>
-              <a:t>Explain tie in to Java.</a:t>
-            </a:r>
+              <a:t>Explain tie in to </a:t>
+            </a:r>
+            <a:r>
+              <a:rPr lang="en-GB" dirty="0" smtClean="0"/>
+              <a:t>Java</a:t>
+            </a:r>
+            <a:r>
+              <a:rPr lang="en-GB" baseline="0" dirty="0" smtClean="0"/>
+              <a:t> – each leaf class is a </a:t>
+            </a:r>
+            <a:r>
+              <a:rPr lang="en-GB" baseline="0" dirty="0" err="1" smtClean="0"/>
+              <a:t>JavaBean</a:t>
+            </a:r>
+            <a:r>
+              <a:rPr lang="en-GB" baseline="0" dirty="0" smtClean="0"/>
+              <a:t>!  This is a better way of </a:t>
+            </a:r>
+            <a:r>
+              <a:rPr lang="en-GB" baseline="0" smtClean="0"/>
+              <a:t>joining beans!</a:t>
+            </a:r>
+            <a:endParaRPr lang="en-GB" dirty="0" smtClean="0"/>
           </a:p>
           <a:p>
             <a:r>
@@ -1209,24 +1230,16 @@
             </a:r>
             <a:r>
               <a:rPr lang="en-GB" baseline="0" dirty="0" smtClean="0"/>
-              <a:t> about dependencies </a:t>
-            </a:r>
+              <a:t> about dependencies on other strata.</a:t>
+            </a:r>
+          </a:p>
+          <a:p>
+            <a:endParaRPr lang="en-GB" baseline="0" dirty="0"/>
+          </a:p>
+          <a:p>
             <a:r>
               <a:rPr lang="en-GB" baseline="0" dirty="0" smtClean="0"/>
-              <a:t>on other strata.</a:t>
-            </a:r>
-          </a:p>
-          <a:p>
-            <a:endParaRPr lang="en-GB" baseline="0" dirty="0"/>
-          </a:p>
-          <a:p>
-            <a:r>
-              <a:rPr lang="en-GB" baseline="0" dirty="0" smtClean="0"/>
-              <a:t>Ownership means that others cannot modify it, but can express deltas against it to alter it</a:t>
-            </a:r>
-            <a:r>
-              <a:rPr lang="en-GB" baseline="0" dirty="0" smtClean="0"/>
-              <a:t>.</a:t>
+              <a:t>Ownership means that others cannot modify it, but can express deltas against it to alter it.</a:t>
             </a:r>
           </a:p>
           <a:p>
@@ -2404,11 +2417,7 @@
           <a:p>
             <a:r>
               <a:rPr lang="en-GB" baseline="0" dirty="0" smtClean="0"/>
-              <a:t>	- version control can be treated orthogonally (2 axes</a:t>
-            </a:r>
-            <a:r>
-              <a:rPr lang="en-GB" baseline="0" dirty="0" smtClean="0"/>
-              <a:t>)</a:t>
+              <a:t>	- version control can be treated orthogonally (2 axes)</a:t>
             </a:r>
           </a:p>
         </p:txBody>
@@ -2525,11 +2534,7 @@
             </a:r>
             <a:r>
               <a:rPr lang="en-GB" baseline="0" dirty="0" smtClean="0"/>
-              <a:t> from </a:t>
-            </a:r>
-            <a:r>
-              <a:rPr lang="en-GB" baseline="0" dirty="0" smtClean="0"/>
-              <a:t>code</a:t>
+              <a:t> from code</a:t>
             </a:r>
           </a:p>
           <a:p>
@@ -3677,7 +3682,7 @@
             <a:fld id="{80205730-B28B-4293-938B-A508842901A8}" type="datetimeFigureOut">
               <a:rPr lang="en-US" smtClean="0"/>
               <a:pPr/>
-              <a:t>2/2/2011</a:t>
+              <a:t>2/3/2011</a:t>
             </a:fld>
             <a:endParaRPr lang="en-GB"/>
           </a:p>
@@ -3869,7 +3874,7 @@
             <a:fld id="{80205730-B28B-4293-938B-A508842901A8}" type="datetimeFigureOut">
               <a:rPr lang="en-US" smtClean="0"/>
               <a:pPr/>
-              <a:t>2/2/2011</a:t>
+              <a:t>2/3/2011</a:t>
             </a:fld>
             <a:endParaRPr lang="en-GB"/>
           </a:p>
@@ -4280,7 +4285,7 @@
             <a:fld id="{80205730-B28B-4293-938B-A508842901A8}" type="datetimeFigureOut">
               <a:rPr lang="en-US" smtClean="0"/>
               <a:pPr/>
-              <a:t>2/2/2011</a:t>
+              <a:t>2/3/2011</a:t>
             </a:fld>
             <a:endParaRPr lang="en-GB"/>
           </a:p>
@@ -4561,7 +4566,7 @@
             <a:fld id="{80205730-B28B-4293-938B-A508842901A8}" type="datetimeFigureOut">
               <a:rPr lang="en-US" smtClean="0"/>
               <a:pPr/>
-              <a:t>2/2/2011</a:t>
+              <a:t>2/3/2011</a:t>
             </a:fld>
             <a:endParaRPr lang="en-GB"/>
           </a:p>
@@ -4956,7 +4961,7 @@
             <a:fld id="{80205730-B28B-4293-938B-A508842901A8}" type="datetimeFigureOut">
               <a:rPr lang="en-US" smtClean="0"/>
               <a:pPr/>
-              <a:t>2/2/2011</a:t>
+              <a:t>2/3/2011</a:t>
             </a:fld>
             <a:endParaRPr lang="en-GB"/>
           </a:p>
@@ -5123,7 +5128,7 @@
             <a:fld id="{80205730-B28B-4293-938B-A508842901A8}" type="datetimeFigureOut">
               <a:rPr lang="en-US" smtClean="0"/>
               <a:pPr/>
-              <a:t>2/2/2011</a:t>
+              <a:t>2/3/2011</a:t>
             </a:fld>
             <a:endParaRPr lang="en-GB"/>
           </a:p>
@@ -5230,7 +5235,7 @@
             <a:fld id="{80205730-B28B-4293-938B-A508842901A8}" type="datetimeFigureOut">
               <a:rPr lang="en-US" smtClean="0"/>
               <a:pPr/>
-              <a:t>2/2/2011</a:t>
+              <a:t>2/3/2011</a:t>
             </a:fld>
             <a:endParaRPr lang="en-GB"/>
           </a:p>
@@ -5508,7 +5513,7 @@
             <a:fld id="{80205730-B28B-4293-938B-A508842901A8}" type="datetimeFigureOut">
               <a:rPr lang="en-US" smtClean="0"/>
               <a:pPr/>
-              <a:t>2/2/2011</a:t>
+              <a:t>2/3/2011</a:t>
             </a:fld>
             <a:endParaRPr lang="en-GB"/>
           </a:p>
@@ -5813,7 +5818,7 @@
             <a:fld id="{80205730-B28B-4293-938B-A508842901A8}" type="datetimeFigureOut">
               <a:rPr lang="en-US" smtClean="0"/>
               <a:pPr/>
-              <a:t>2/2/2011</a:t>
+              <a:t>2/3/2011</a:t>
             </a:fld>
             <a:endParaRPr lang="en-GB"/>
           </a:p>
@@ -20229,17 +20234,12 @@
               <a:rPr lang="en-GB" dirty="0" smtClean="0"/>
               <a:t>Architecture / structure is always explicit</a:t>
             </a:r>
-            <a:endParaRPr lang="en-GB" dirty="0" smtClean="0"/>
           </a:p>
           <a:p>
             <a:pPr lvl="1"/>
             <a:r>
               <a:rPr lang="en-GB" dirty="0" smtClean="0"/>
-              <a:t>Encodes </a:t>
-            </a:r>
-            <a:r>
-              <a:rPr lang="en-GB" dirty="0" smtClean="0"/>
-              <a:t>many best practices</a:t>
+              <a:t>Encodes many best practices</a:t>
             </a:r>
           </a:p>
           <a:p>
@@ -20249,13 +20249,8 @@
           <a:p>
             <a:r>
               <a:rPr lang="en-GB" dirty="0" smtClean="0"/>
-              <a:t>Creation and extension </a:t>
-            </a:r>
-            <a:r>
-              <a:rPr lang="en-GB" dirty="0" smtClean="0"/>
-              <a:t>help each other</a:t>
-            </a:r>
-            <a:endParaRPr lang="en-GB" dirty="0" smtClean="0"/>
+              <a:t>Creation and extension help each other</a:t>
+            </a:r>
           </a:p>
           <a:p>
             <a:pPr lvl="1"/>
@@ -20278,43 +20273,22 @@
           <a:p>
             <a:r>
               <a:rPr lang="en-GB" dirty="0" smtClean="0"/>
-              <a:t>Unifies reuse </a:t>
-            </a:r>
+              <a:t>Unifies reuse and evolution concepts at design stage</a:t>
+            </a:r>
+          </a:p>
+          <a:p>
+            <a:pPr lvl="1"/>
             <a:r>
               <a:rPr lang="en-GB" dirty="0" smtClean="0"/>
-              <a:t>and evolution </a:t>
-            </a:r>
+              <a:t>Hard to “let go” of designing in extension points</a:t>
+            </a:r>
+          </a:p>
+          <a:p>
+            <a:pPr lvl="1"/>
             <a:r>
               <a:rPr lang="en-GB" dirty="0" smtClean="0"/>
-              <a:t>concepts at design stage</a:t>
-            </a:r>
-          </a:p>
-          <a:p>
-            <a:pPr lvl="1"/>
-            <a:r>
-              <a:rPr lang="en-GB" dirty="0" smtClean="0"/>
-              <a:t>Hard </a:t>
-            </a:r>
-            <a:r>
-              <a:rPr lang="en-GB" dirty="0" smtClean="0"/>
-              <a:t>to “let go” of designing in extension </a:t>
-            </a:r>
-            <a:r>
-              <a:rPr lang="en-GB" dirty="0" smtClean="0"/>
-              <a:t>points</a:t>
-            </a:r>
-          </a:p>
-          <a:p>
-            <a:pPr lvl="1"/>
-            <a:r>
-              <a:rPr lang="en-GB" dirty="0" smtClean="0"/>
-              <a:t>Slightly “uncanny” feeling – agile architecture</a:t>
-            </a:r>
-            <a:r>
-              <a:rPr lang="en-GB" dirty="0" smtClean="0"/>
-              <a:t>!</a:t>
-            </a:r>
-            <a:endParaRPr lang="en-GB" dirty="0" smtClean="0"/>
+              <a:t>Slightly “uncanny” feeling – agile architecture!</a:t>
+            </a:r>
           </a:p>
           <a:p>
             <a:pPr lvl="1"/>
@@ -20323,15 +20297,7 @@
           <a:p>
             <a:r>
               <a:rPr lang="en-GB" dirty="0" smtClean="0"/>
-              <a:t>Evolve is </a:t>
-            </a:r>
-            <a:r>
-              <a:rPr lang="en-GB" dirty="0" smtClean="0"/>
-              <a:t>aimed </a:t>
-            </a:r>
-            <a:r>
-              <a:rPr lang="en-GB" dirty="0" smtClean="0"/>
-              <a:t>at industry developers!</a:t>
+              <a:t>Evolve is aimed at industry developers!</a:t>
             </a:r>
           </a:p>
           <a:p>

</xml_diff>